<commit_message>
changed text from danish to english and updated PP
</commit_message>
<xml_diff>
--- a/Aktionshus H2.pptx
+++ b/Aktionshus H2.pptx
@@ -24,7 +24,7 @@
     <p:sldId id="279" r:id="rId15"/>
     <p:sldId id="268" r:id="rId16"/>
     <p:sldId id="396" r:id="rId17"/>
-    <p:sldId id="391" r:id="rId18"/>
+    <p:sldId id="397" r:id="rId18"/>
   </p:sldIdLst>
   <p:sldSz cx="12192000" cy="6858000"/>
   <p:notesSz cx="6858000" cy="9144000"/>
@@ -241,7 +241,7 @@
             <a:pPr rtl="0"/>
             <a:fld id="{EE1040D4-4151-4C65-9AC3-C3163B9A624A}" type="datetime1">
               <a:rPr lang="da-DK" smtClean="0"/>
-              <a:t>06-10-2025</a:t>
+              <a:t>07-10-2025</a:t>
             </a:fld>
             <a:endParaRPr lang="en-US"/>
           </a:p>
@@ -423,7 +423,7 @@
             <a:pPr rtl="0"/>
             <a:fld id="{E3F84BF6-C0C3-4933-AF58-292ABAF910E0}" type="datetime1">
               <a:rPr lang="da-DK" smtClean="0"/>
-              <a:t>06-10-2025</a:t>
+              <a:t>07-10-2025</a:t>
             </a:fld>
             <a:endParaRPr lang="en-US"/>
           </a:p>
@@ -791,7 +791,7 @@
             <a:pPr rtl="0"/>
             <a:fld id="{055E89FF-DBE7-4694-AA93-D4A1999970F8}" type="datetime1">
               <a:rPr lang="da-DK" smtClean="0"/>
-              <a:t>06-10-2025</a:t>
+              <a:t>07-10-2025</a:t>
             </a:fld>
             <a:endParaRPr lang="en-US"/>
           </a:p>
@@ -907,7 +907,7 @@
             <a:pPr rtl="0"/>
             <a:fld id="{38EEB378-2AE3-45E8-AD65-B8210FA10C2C}" type="datetime1">
               <a:rPr lang="da-DK" smtClean="0"/>
-              <a:t>06-10-2025</a:t>
+              <a:t>07-10-2025</a:t>
             </a:fld>
             <a:endParaRPr lang="en-US"/>
           </a:p>
@@ -1023,7 +1023,7 @@
             <a:pPr rtl="0"/>
             <a:fld id="{84C43F27-3A36-48E9-AFA8-3790D40A53C4}" type="datetime1">
               <a:rPr lang="da-DK" smtClean="0"/>
-              <a:t>06-10-2025</a:t>
+              <a:t>07-10-2025</a:t>
             </a:fld>
             <a:endParaRPr lang="en-US"/>
           </a:p>
@@ -1139,7 +1139,7 @@
             <a:pPr rtl="0"/>
             <a:fld id="{E50F979C-4D0E-42BB-A5F8-C60C66AE2214}" type="datetime1">
               <a:rPr lang="da-DK" smtClean="0"/>
-              <a:t>06-10-2025</a:t>
+              <a:t>07-10-2025</a:t>
             </a:fld>
             <a:endParaRPr lang="en-US"/>
           </a:p>
@@ -13448,37 +13448,8 @@
           <a:p>
             <a:pPr rtl="0"/>
             <a:r>
-              <a:rPr lang="da-DK" noProof="0"/>
-              <a:t>Tirsdag d. 2. februar 20XX</a:t>
-            </a:r>
-          </a:p>
-        </p:txBody>
-      </p:sp>
-      <p:sp>
-        <p:nvSpPr>
-          <p:cNvPr id="5" name="Pladsholder til sidefod 4">
-            <a:extLst>
-              <a:ext uri="{FF2B5EF4-FFF2-40B4-BE49-F238E27FC236}">
-                <a16:creationId xmlns:a16="http://schemas.microsoft.com/office/drawing/2014/main" id="{81DC3F18-3FEA-E6A5-0348-9103703504CD}"/>
-              </a:ext>
-            </a:extLst>
-          </p:cNvPr>
-          <p:cNvSpPr>
-            <a:spLocks noGrp="1"/>
-          </p:cNvSpPr>
-          <p:nvPr>
-            <p:ph type="ftr" sz="quarter" idx="11"/>
-          </p:nvPr>
-        </p:nvSpPr>
-        <p:spPr/>
-        <p:txBody>
-          <a:bodyPr/>
-          <a:lstStyle/>
-          <a:p>
-            <a:pPr rtl="0"/>
-            <a:r>
-              <a:rPr lang="da-DK" noProof="0"/>
-              <a:t>Eksempel på fodnotetekst</a:t>
+              <a:rPr lang="da-DK" noProof="0" dirty="0"/>
+              <a:t>Tirsdag d. 7 oktober 2025</a:t>
             </a:r>
           </a:p>
         </p:txBody>
@@ -13657,39 +13628,9 @@
           <a:bodyPr rtlCol="0"/>
           <a:lstStyle/>
           <a:p>
-            <a:pPr rtl="0"/>
-            <a:r>
-              <a:rPr lang="da-DK"/>
-              <a:t>Tirsdag d. 2. februar 20XX</a:t>
-            </a:r>
-          </a:p>
-        </p:txBody>
-      </p:sp>
-      <p:sp>
-        <p:nvSpPr>
-          <p:cNvPr id="20" name="Pladsholder til sidefod 19">
-            <a:extLst>
-              <a:ext uri="{FF2B5EF4-FFF2-40B4-BE49-F238E27FC236}">
-                <a16:creationId xmlns:a16="http://schemas.microsoft.com/office/drawing/2014/main" id="{C77C6228-C5A8-44DC-ABD7-A22A4475D3DF}"/>
-              </a:ext>
-            </a:extLst>
-          </p:cNvPr>
-          <p:cNvSpPr>
-            <a:spLocks noGrp="1"/>
-          </p:cNvSpPr>
-          <p:nvPr>
-            <p:ph type="ftr" sz="quarter" idx="11"/>
-          </p:nvPr>
-        </p:nvSpPr>
-        <p:spPr/>
-        <p:txBody>
-          <a:bodyPr rtlCol="0"/>
-          <a:lstStyle/>
-          <a:p>
-            <a:pPr rtl="0"/>
-            <a:r>
-              <a:rPr lang="da-DK"/>
-              <a:t>Eksempel på fodnotetekst</a:t>
+            <a:r>
+              <a:rPr lang="da-DK" dirty="0"/>
+              <a:t>Tirsdag d. 7. oktober 2025</a:t>
             </a:r>
           </a:p>
         </p:txBody>
@@ -13813,42 +13754,8 @@
           <a:p>
             <a:pPr rtl="0"/>
             <a:r>
-              <a:rPr lang="da-DK"/>
-              <a:t>Tirsdag d. 2. februar 20XX</a:t>
-            </a:r>
-          </a:p>
-        </p:txBody>
-      </p:sp>
-      <p:sp>
-        <p:nvSpPr>
-          <p:cNvPr id="8" name="Pladsholder til sidefod 7">
-            <a:extLst>
-              <a:ext uri="{FF2B5EF4-FFF2-40B4-BE49-F238E27FC236}">
-                <a16:creationId xmlns:a16="http://schemas.microsoft.com/office/drawing/2014/main" id="{6375D7F3-165A-439B-8D1D-6553B68C2886}"/>
-              </a:ext>
-            </a:extLst>
-          </p:cNvPr>
-          <p:cNvSpPr>
-            <a:spLocks noGrp="1"/>
-          </p:cNvSpPr>
-          <p:nvPr>
-            <p:ph type="ftr" sz="quarter" idx="11"/>
-          </p:nvPr>
-        </p:nvSpPr>
-        <p:spPr>
-          <a:xfrm>
-            <a:off x="3359150" y="6507212"/>
-            <a:ext cx="6379210" cy="153888"/>
-          </a:xfrm>
-        </p:spPr>
-        <p:txBody>
-          <a:bodyPr rtlCol="0"/>
-          <a:lstStyle/>
-          <a:p>
-            <a:pPr rtl="0"/>
-            <a:r>
-              <a:rPr lang="da-DK"/>
-              <a:t>Eksempel på fodnotetekst</a:t>
+              <a:rPr lang="da-DK" dirty="0"/>
+              <a:t>Tirsdag d. 7 oktober 2025</a:t>
             </a:r>
           </a:p>
         </p:txBody>
@@ -14061,39 +13968,9 @@
           <a:bodyPr/>
           <a:lstStyle/>
           <a:p>
-            <a:pPr rtl="0"/>
-            <a:r>
-              <a:rPr lang="da-DK" noProof="0"/>
-              <a:t>Tirsdag d. 2. februar 20XX</a:t>
-            </a:r>
-          </a:p>
-        </p:txBody>
-      </p:sp>
-      <p:sp>
-        <p:nvSpPr>
-          <p:cNvPr id="16" name="Pladsholder til sidefod 15">
-            <a:extLst>
-              <a:ext uri="{FF2B5EF4-FFF2-40B4-BE49-F238E27FC236}">
-                <a16:creationId xmlns:a16="http://schemas.microsoft.com/office/drawing/2014/main" id="{09C278A2-CD2E-663D-5D8F-C1A3118351B5}"/>
-              </a:ext>
-            </a:extLst>
-          </p:cNvPr>
-          <p:cNvSpPr>
-            <a:spLocks noGrp="1"/>
-          </p:cNvSpPr>
-          <p:nvPr>
-            <p:ph type="ftr" sz="quarter" idx="11"/>
-          </p:nvPr>
-        </p:nvSpPr>
-        <p:spPr/>
-        <p:txBody>
-          <a:bodyPr/>
-          <a:lstStyle/>
-          <a:p>
-            <a:pPr rtl="0"/>
-            <a:r>
-              <a:rPr lang="da-DK" noProof="0"/>
-              <a:t>Eksempel på fodnotetekst</a:t>
+            <a:r>
+              <a:rPr lang="da-DK" dirty="0"/>
+              <a:t>Tirsdag d. 7. oktober 2025</a:t>
             </a:r>
           </a:p>
         </p:txBody>
@@ -14220,10 +14097,10 @@
       </p:grpSpPr>
       <p:sp>
         <p:nvSpPr>
-          <p:cNvPr id="22" name="Titel 21">
-            <a:extLst>
-              <a:ext uri="{FF2B5EF4-FFF2-40B4-BE49-F238E27FC236}">
-                <a16:creationId xmlns:a16="http://schemas.microsoft.com/office/drawing/2014/main" id="{F8FAEED9-1ECD-45F9-87A0-9394BAEABB79}"/>
+          <p:cNvPr id="15" name="Pladsholder til dato 14">
+            <a:extLst>
+              <a:ext uri="{FF2B5EF4-FFF2-40B4-BE49-F238E27FC236}">
+                <a16:creationId xmlns:a16="http://schemas.microsoft.com/office/drawing/2014/main" id="{CB62FEBA-0D16-7019-BA0D-E55B6C9F1093}"/>
               </a:ext>
             </a:extLst>
           </p:cNvPr>
@@ -14231,33 +14108,28 @@
             <a:spLocks noGrp="1"/>
           </p:cNvSpPr>
           <p:nvPr>
-            <p:ph type="ctrTitle"/>
-          </p:nvPr>
-        </p:nvSpPr>
-        <p:spPr>
-          <a:xfrm>
-            <a:off x="550863" y="549275"/>
-            <a:ext cx="5437187" cy="2986234"/>
-          </a:xfrm>
-        </p:spPr>
-        <p:txBody>
-          <a:bodyPr rtlCol="0"/>
+            <p:ph type="dt" sz="half" idx="10"/>
+          </p:nvPr>
+        </p:nvSpPr>
+        <p:spPr/>
+        <p:txBody>
+          <a:bodyPr/>
           <a:lstStyle/>
           <a:p>
             <a:pPr rtl="0"/>
             <a:r>
-              <a:rPr lang="da-DK"/>
-              <a:t>Tak</a:t>
-            </a:r>
-          </a:p>
-        </p:txBody>
-      </p:sp>
-      <p:sp>
-        <p:nvSpPr>
-          <p:cNvPr id="23" name="Undertitel 22">
-            <a:extLst>
-              <a:ext uri="{FF2B5EF4-FFF2-40B4-BE49-F238E27FC236}">
-                <a16:creationId xmlns:a16="http://schemas.microsoft.com/office/drawing/2014/main" id="{8E5E4638-9BCB-4C2E-914F-CC868E2020D5}"/>
+              <a:rPr lang="da-DK" noProof="0" dirty="0"/>
+              <a:t>Tirsdag d. 7. oktober 2025</a:t>
+            </a:r>
+          </a:p>
+        </p:txBody>
+      </p:sp>
+      <p:sp>
+        <p:nvSpPr>
+          <p:cNvPr id="17" name="Pladsholder til slidenummer 16">
+            <a:extLst>
+              <a:ext uri="{FF2B5EF4-FFF2-40B4-BE49-F238E27FC236}">
+                <a16:creationId xmlns:a16="http://schemas.microsoft.com/office/drawing/2014/main" id="{03B7831A-6713-3644-E626-ED3AC3376AE8}"/>
               </a:ext>
             </a:extLst>
           </p:cNvPr>
@@ -14265,217 +14137,87 @@
             <a:spLocks noGrp="1"/>
           </p:cNvSpPr>
           <p:nvPr>
-            <p:ph type="subTitle" idx="1"/>
-          </p:nvPr>
-        </p:nvSpPr>
-        <p:spPr>
-          <a:xfrm>
-            <a:off x="550863" y="3827610"/>
-            <a:ext cx="5437187" cy="2265216"/>
-          </a:xfrm>
-        </p:spPr>
-        <p:txBody>
-          <a:bodyPr rtlCol="0"/>
+            <p:ph type="sldNum" sz="quarter" idx="12"/>
+          </p:nvPr>
+        </p:nvSpPr>
+        <p:spPr/>
+        <p:txBody>
+          <a:bodyPr/>
           <a:lstStyle/>
           <a:p>
             <a:pPr rtl="0"/>
-            <a:r>
-              <a:rPr lang="da-DK"/>
-              <a:t>Præsentationsværtens navn</a:t>
-            </a:r>
-          </a:p>
-          <a:p>
-            <a:pPr rtl="0"/>
-            <a:r>
-              <a:rPr lang="da-DK"/>
-              <a:t>Mailadresse</a:t>
-            </a:r>
-          </a:p>
-          <a:p>
-            <a:pPr rtl="0"/>
-            <a:r>
-              <a:rPr lang="da-DK"/>
-              <a:t>Webstedsadresse</a:t>
-            </a:r>
+            <a:fld id="{DBA1B0FB-D917-4C8C-928F-313BD683BF39}" type="slidenum">
+              <a:rPr lang="da-DK" noProof="0" smtClean="0"/>
+              <a:t>14</a:t>
+            </a:fld>
+            <a:endParaRPr lang="da-DK" noProof="0"/>
           </a:p>
         </p:txBody>
       </p:sp>
       <p:pic>
         <p:nvPicPr>
-          <p:cNvPr id="27" name="Pladsholder til billede 26" descr="Digital baggrund i datapunkter">
-            <a:extLst>
-              <a:ext uri="{FF2B5EF4-FFF2-40B4-BE49-F238E27FC236}">
-                <a16:creationId xmlns:a16="http://schemas.microsoft.com/office/drawing/2014/main" id="{9E660784-34E2-4CDA-926A-DDD6AAF35046}"/>
+          <p:cNvPr id="19" name="Billede 18" descr="Et billede, der indeholder diagram, tekst, Plan, Teknisk tegning&#10;&#10;AI-genereret indhold kan være ukorrekt.">
+            <a:extLst>
+              <a:ext uri="{FF2B5EF4-FFF2-40B4-BE49-F238E27FC236}">
+                <a16:creationId xmlns:a16="http://schemas.microsoft.com/office/drawing/2014/main" id="{42333FFC-8FE4-7675-F264-37D467B75B33}"/>
               </a:ext>
             </a:extLst>
           </p:cNvPr>
           <p:cNvPicPr>
-            <a:picLocks noGrp="1" noChangeAspect="1"/>
+            <a:picLocks noChangeAspect="1"/>
           </p:cNvPicPr>
-          <p:nvPr>
-            <p:ph type="pic" sz="quarter" idx="15"/>
-          </p:nvPr>
+          <p:nvPr/>
         </p:nvPicPr>
-        <p:blipFill rotWithShape="1">
-          <a:blip r:embed="rId2" cstate="screen">
-            <a:extLst>
-              <a:ext uri="{28A0092B-C50C-407E-A947-70E740481C1C}">
-                <a14:useLocalDpi xmlns:a14="http://schemas.microsoft.com/office/drawing/2010/main" val="0"/>
-              </a:ext>
-            </a:extLst>
-          </a:blip>
-          <a:srcRect/>
-          <a:stretch/>
+        <p:blipFill>
+          <a:blip r:embed="rId2"/>
+          <a:stretch>
+            <a:fillRect/>
+          </a:stretch>
         </p:blipFill>
         <p:spPr>
           <a:xfrm>
-            <a:off x="6556248" y="548640"/>
-            <a:ext cx="5084064" cy="2880360"/>
+            <a:off x="694706" y="1027087"/>
+            <a:ext cx="4688113" cy="4346498"/>
           </a:xfrm>
+          <a:prstGeom prst="rect">
+            <a:avLst/>
+          </a:prstGeom>
         </p:spPr>
       </p:pic>
       <p:pic>
         <p:nvPicPr>
-          <p:cNvPr id="33" name="Pladsholder til billede 32" descr="Digital baggrund i datapunkter">
-            <a:extLst>
-              <a:ext uri="{FF2B5EF4-FFF2-40B4-BE49-F238E27FC236}">
-                <a16:creationId xmlns:a16="http://schemas.microsoft.com/office/drawing/2014/main" id="{48106962-23C6-4DFE-BB3A-E5FFF03F38CE}"/>
+          <p:cNvPr id="21" name="Billede 20" descr="Et billede, der indeholder tekst, diagram, Plan, Teknisk tegning&#10;&#10;AI-genereret indhold kan være ukorrekt.">
+            <a:extLst>
+              <a:ext uri="{FF2B5EF4-FFF2-40B4-BE49-F238E27FC236}">
+                <a16:creationId xmlns:a16="http://schemas.microsoft.com/office/drawing/2014/main" id="{BE510445-C36D-5C82-905A-A5237478A989}"/>
               </a:ext>
             </a:extLst>
           </p:cNvPr>
           <p:cNvPicPr>
-            <a:picLocks noGrp="1" noChangeAspect="1"/>
+            <a:picLocks noChangeAspect="1"/>
           </p:cNvPicPr>
-          <p:nvPr>
-            <p:ph type="pic" sz="quarter" idx="16"/>
-          </p:nvPr>
+          <p:nvPr/>
         </p:nvPicPr>
-        <p:blipFill rotWithShape="1">
-          <a:blip r:embed="rId3" cstate="screen">
-            <a:extLst>
-              <a:ext uri="{28A0092B-C50C-407E-A947-70E740481C1C}">
-                <a14:useLocalDpi xmlns:a14="http://schemas.microsoft.com/office/drawing/2010/main" val="0"/>
-              </a:ext>
-            </a:extLst>
-          </a:blip>
-          <a:srcRect/>
-          <a:stretch/>
+        <p:blipFill>
+          <a:blip r:embed="rId3"/>
+          <a:stretch>
+            <a:fillRect/>
+          </a:stretch>
         </p:blipFill>
         <p:spPr>
           <a:xfrm>
-            <a:off x="6556248" y="3429000"/>
-            <a:ext cx="5084064" cy="2880360"/>
+            <a:off x="6096000" y="1775361"/>
+            <a:ext cx="5711167" cy="3040098"/>
           </a:xfrm>
+          <a:prstGeom prst="rect">
+            <a:avLst/>
+          </a:prstGeom>
         </p:spPr>
       </p:pic>
-      <p:sp>
-        <p:nvSpPr>
-          <p:cNvPr id="4" name="Pladsholder til dato 3">
-            <a:extLst>
-              <a:ext uri="{FF2B5EF4-FFF2-40B4-BE49-F238E27FC236}">
-                <a16:creationId xmlns:a16="http://schemas.microsoft.com/office/drawing/2014/main" id="{7823E305-6365-4345-8BD1-4A31C61D96CB}"/>
-              </a:ext>
-            </a:extLst>
-          </p:cNvPr>
-          <p:cNvSpPr>
-            <a:spLocks noGrp="1"/>
-          </p:cNvSpPr>
-          <p:nvPr>
-            <p:ph type="dt" sz="half" idx="10"/>
-          </p:nvPr>
-        </p:nvSpPr>
-        <p:spPr>
-          <a:xfrm>
-            <a:off x="550863" y="6507212"/>
-            <a:ext cx="2628900" cy="153888"/>
-          </a:xfrm>
-        </p:spPr>
-        <p:txBody>
-          <a:bodyPr rtlCol="0"/>
-          <a:lstStyle/>
-          <a:p>
-            <a:pPr rtl="0"/>
-            <a:r>
-              <a:rPr lang="da-DK"/>
-              <a:t>Tirsdag d. 2. februar 20XX</a:t>
-            </a:r>
-          </a:p>
-        </p:txBody>
-      </p:sp>
-      <p:sp>
-        <p:nvSpPr>
-          <p:cNvPr id="5" name="Pladsholder til sidefod 4">
-            <a:extLst>
-              <a:ext uri="{FF2B5EF4-FFF2-40B4-BE49-F238E27FC236}">
-                <a16:creationId xmlns:a16="http://schemas.microsoft.com/office/drawing/2014/main" id="{0B37A3FF-ED32-4C4A-A21F-848A3BF6F896}"/>
-              </a:ext>
-            </a:extLst>
-          </p:cNvPr>
-          <p:cNvSpPr>
-            <a:spLocks noGrp="1"/>
-          </p:cNvSpPr>
-          <p:nvPr>
-            <p:ph type="ftr" sz="quarter" idx="11"/>
-          </p:nvPr>
-        </p:nvSpPr>
-        <p:spPr>
-          <a:xfrm>
-            <a:off x="3359150" y="6507212"/>
-            <a:ext cx="6379210" cy="153888"/>
-          </a:xfrm>
-        </p:spPr>
-        <p:txBody>
-          <a:bodyPr rtlCol="0"/>
-          <a:lstStyle/>
-          <a:p>
-            <a:pPr rtl="0"/>
-            <a:r>
-              <a:rPr lang="da-DK"/>
-              <a:t>Eksempel på fodnotetekst</a:t>
-            </a:r>
-          </a:p>
-        </p:txBody>
-      </p:sp>
-      <p:sp>
-        <p:nvSpPr>
-          <p:cNvPr id="6" name="Pladsholder til slidenummer 5">
-            <a:extLst>
-              <a:ext uri="{FF2B5EF4-FFF2-40B4-BE49-F238E27FC236}">
-                <a16:creationId xmlns:a16="http://schemas.microsoft.com/office/drawing/2014/main" id="{36E60F23-FB58-4EF8-82FD-E86CED25FDD4}"/>
-              </a:ext>
-            </a:extLst>
-          </p:cNvPr>
-          <p:cNvSpPr>
-            <a:spLocks noGrp="1"/>
-          </p:cNvSpPr>
-          <p:nvPr>
-            <p:ph type="sldNum" sz="quarter" idx="12"/>
-          </p:nvPr>
-        </p:nvSpPr>
-        <p:spPr>
-          <a:xfrm>
-            <a:off x="9948863" y="6507212"/>
-            <a:ext cx="1692274" cy="153888"/>
-          </a:xfrm>
-        </p:spPr>
-        <p:txBody>
-          <a:bodyPr rtlCol="0"/>
-          <a:lstStyle/>
-          <a:p>
-            <a:pPr rtl="0"/>
-            <a:fld id="{DBA1B0FB-D917-4C8C-928F-313BD683BF39}" type="slidenum">
-              <a:rPr lang="da-DK" smtClean="0"/>
-              <a:pPr rtl="0"/>
-              <a:t>14</a:t>
-            </a:fld>
-            <a:endParaRPr lang="da-DK"/>
-          </a:p>
-        </p:txBody>
-      </p:sp>
     </p:spTree>
     <p:extLst>
       <p:ext uri="{BB962C8B-B14F-4D97-AF65-F5344CB8AC3E}">
-        <p14:creationId xmlns:p14="http://schemas.microsoft.com/office/powerpoint/2010/main" val="3247798845"/>
+        <p14:creationId xmlns:p14="http://schemas.microsoft.com/office/powerpoint/2010/main" val="385865982"/>
       </p:ext>
     </p:extLst>
   </p:cSld>
@@ -14564,7 +14306,7 @@
           <a:p>
             <a:r>
               <a:rPr lang="da-DK" dirty="0"/>
-              <a:t>GUI-eksempler</a:t>
+              <a:t>GUI-eksempler og demo</a:t>
             </a:r>
           </a:p>
           <a:p>
@@ -14636,108 +14378,6 @@
           </a:p>
         </p:txBody>
       </p:sp>
-      <p:pic>
-        <p:nvPicPr>
-          <p:cNvPr id="8" name="Pladsholder til billede 7" descr="Digitale data">
-            <a:extLst>
-              <a:ext uri="{FF2B5EF4-FFF2-40B4-BE49-F238E27FC236}">
-                <a16:creationId xmlns:a16="http://schemas.microsoft.com/office/drawing/2014/main" id="{06D2324F-3B7B-45EF-9584-C8EADD2C8C0B}"/>
-              </a:ext>
-            </a:extLst>
-          </p:cNvPr>
-          <p:cNvPicPr>
-            <a:picLocks noGrp="1" noChangeAspect="1"/>
-          </p:cNvPicPr>
-          <p:nvPr>
-            <p:ph type="pic" sz="quarter" idx="13"/>
-          </p:nvPr>
-        </p:nvPicPr>
-        <p:blipFill rotWithShape="1">
-          <a:blip r:embed="rId2" cstate="screen">
-            <a:extLst>
-              <a:ext uri="{28A0092B-C50C-407E-A947-70E740481C1C}">
-                <a14:useLocalDpi xmlns:a14="http://schemas.microsoft.com/office/drawing/2010/main" val="0"/>
-              </a:ext>
-            </a:extLst>
-          </a:blip>
-          <a:srcRect/>
-          <a:stretch/>
-        </p:blipFill>
-        <p:spPr>
-          <a:xfrm>
-            <a:off x="5208928" y="1596771"/>
-            <a:ext cx="3448558" cy="3448558"/>
-          </a:xfrm>
-        </p:spPr>
-      </p:pic>
-      <p:pic>
-        <p:nvPicPr>
-          <p:cNvPr id="10" name="Pladsholder til billede 9" descr="Datapunkter ">
-            <a:extLst>
-              <a:ext uri="{FF2B5EF4-FFF2-40B4-BE49-F238E27FC236}">
-                <a16:creationId xmlns:a16="http://schemas.microsoft.com/office/drawing/2014/main" id="{71F862F9-0E8A-4DB9-8083-1C3AA6E5D777}"/>
-              </a:ext>
-            </a:extLst>
-          </p:cNvPr>
-          <p:cNvPicPr>
-            <a:picLocks noGrp="1" noChangeAspect="1"/>
-          </p:cNvPicPr>
-          <p:nvPr>
-            <p:ph type="pic" sz="quarter" idx="14"/>
-          </p:nvPr>
-        </p:nvPicPr>
-        <p:blipFill rotWithShape="1">
-          <a:blip r:embed="rId3" cstate="screen">
-            <a:extLst>
-              <a:ext uri="{28A0092B-C50C-407E-A947-70E740481C1C}">
-                <a14:useLocalDpi xmlns:a14="http://schemas.microsoft.com/office/drawing/2010/main" val="0"/>
-              </a:ext>
-            </a:extLst>
-          </a:blip>
-          <a:srcRect/>
-          <a:stretch/>
-        </p:blipFill>
-        <p:spPr>
-          <a:xfrm>
-            <a:off x="8918575" y="596392"/>
-            <a:ext cx="2263776" cy="2263776"/>
-          </a:xfrm>
-        </p:spPr>
-      </p:pic>
-      <p:pic>
-        <p:nvPicPr>
-          <p:cNvPr id="12" name="Pladsholder til billede 11" descr="Databaggrund">
-            <a:extLst>
-              <a:ext uri="{FF2B5EF4-FFF2-40B4-BE49-F238E27FC236}">
-                <a16:creationId xmlns:a16="http://schemas.microsoft.com/office/drawing/2014/main" id="{A63F39B9-0715-40B5-8ECB-9B983F99C690}"/>
-              </a:ext>
-            </a:extLst>
-          </p:cNvPr>
-          <p:cNvPicPr>
-            <a:picLocks noGrp="1" noChangeAspect="1"/>
-          </p:cNvPicPr>
-          <p:nvPr>
-            <p:ph type="pic" sz="quarter" idx="15"/>
-          </p:nvPr>
-        </p:nvPicPr>
-        <p:blipFill rotWithShape="1">
-          <a:blip r:embed="rId4" cstate="screen">
-            <a:extLst>
-              <a:ext uri="{28A0092B-C50C-407E-A947-70E740481C1C}">
-                <a14:useLocalDpi xmlns:a14="http://schemas.microsoft.com/office/drawing/2010/main" val="0"/>
-              </a:ext>
-            </a:extLst>
-          </a:blip>
-          <a:srcRect/>
-          <a:stretch/>
-        </p:blipFill>
-        <p:spPr>
-          <a:xfrm>
-            <a:off x="9091612" y="3324733"/>
-            <a:ext cx="2936876" cy="2936876"/>
-          </a:xfrm>
-        </p:spPr>
-      </p:pic>
       <p:sp>
         <p:nvSpPr>
           <p:cNvPr id="13" name="Pladsholder til dato 12">
@@ -14764,44 +14404,9 @@
           <a:bodyPr rtlCol="0"/>
           <a:lstStyle/>
           <a:p>
-            <a:pPr rtl="0"/>
-            <a:r>
-              <a:rPr lang="da-DK"/>
-              <a:t>Tirsdag d. 2. februar 20XX</a:t>
-            </a:r>
-          </a:p>
-        </p:txBody>
-      </p:sp>
-      <p:sp>
-        <p:nvSpPr>
-          <p:cNvPr id="14" name="Pladsholder til sidefod 13">
-            <a:extLst>
-              <a:ext uri="{FF2B5EF4-FFF2-40B4-BE49-F238E27FC236}">
-                <a16:creationId xmlns:a16="http://schemas.microsoft.com/office/drawing/2014/main" id="{B01DF4D0-78BC-4C8C-9570-26F0B225433A}"/>
-              </a:ext>
-            </a:extLst>
-          </p:cNvPr>
-          <p:cNvSpPr>
-            <a:spLocks noGrp="1"/>
-          </p:cNvSpPr>
-          <p:nvPr>
-            <p:ph type="ftr" sz="quarter" idx="11"/>
-          </p:nvPr>
-        </p:nvSpPr>
-        <p:spPr>
-          <a:xfrm>
-            <a:off x="3359150" y="6507212"/>
-            <a:ext cx="6379210" cy="153888"/>
-          </a:xfrm>
-        </p:spPr>
-        <p:txBody>
-          <a:bodyPr rtlCol="0"/>
-          <a:lstStyle/>
-          <a:p>
-            <a:pPr rtl="0"/>
-            <a:r>
-              <a:rPr lang="da-DK"/>
-              <a:t>Eksempel på fodnotetekst</a:t>
+            <a:r>
+              <a:rPr lang="da-DK" dirty="0"/>
+              <a:t>Tirsdag d. 7. oktober 2025</a:t>
             </a:r>
           </a:p>
         </p:txBody>
@@ -14842,6 +14447,108 @@
           </a:p>
         </p:txBody>
       </p:sp>
+      <p:pic>
+        <p:nvPicPr>
+          <p:cNvPr id="5" name="Billede 4" descr="Et billede, der indeholder cirkel, skitse, tegning, clipart&#10;&#10;AI-genereret indhold kan være ukorrekt.">
+            <a:extLst>
+              <a:ext uri="{FF2B5EF4-FFF2-40B4-BE49-F238E27FC236}">
+                <a16:creationId xmlns:a16="http://schemas.microsoft.com/office/drawing/2014/main" id="{0D919252-A922-96C2-23C1-A8D3E562B84E}"/>
+              </a:ext>
+            </a:extLst>
+          </p:cNvPr>
+          <p:cNvPicPr>
+            <a:picLocks noChangeAspect="1"/>
+          </p:cNvPicPr>
+          <p:nvPr/>
+        </p:nvPicPr>
+        <p:blipFill>
+          <a:blip r:embed="rId2"/>
+          <a:stretch>
+            <a:fillRect/>
+          </a:stretch>
+        </p:blipFill>
+        <p:spPr>
+          <a:xfrm>
+            <a:off x="5615823" y="1597156"/>
+            <a:ext cx="3302752" cy="3556810"/>
+          </a:xfrm>
+          <a:prstGeom prst="ellipse">
+            <a:avLst/>
+          </a:prstGeom>
+          <a:ln>
+            <a:noFill/>
+          </a:ln>
+          <a:effectLst>
+            <a:softEdge rad="112500"/>
+          </a:effectLst>
+        </p:spPr>
+      </p:pic>
+      <p:pic>
+        <p:nvPicPr>
+          <p:cNvPr id="11" name="Billede 10" descr="Et billede, der indeholder Grafik, cirkel, Font/skrifttype, symbol&#10;&#10;AI-genereret indhold kan være ukorrekt.">
+            <a:extLst>
+              <a:ext uri="{FF2B5EF4-FFF2-40B4-BE49-F238E27FC236}">
+                <a16:creationId xmlns:a16="http://schemas.microsoft.com/office/drawing/2014/main" id="{5A478DEF-0AC8-F691-A640-F4F982A682E4}"/>
+              </a:ext>
+            </a:extLst>
+          </p:cNvPr>
+          <p:cNvPicPr>
+            <a:picLocks noChangeAspect="1"/>
+          </p:cNvPicPr>
+          <p:nvPr/>
+        </p:nvPicPr>
+        <p:blipFill>
+          <a:blip r:embed="rId3"/>
+          <a:stretch>
+            <a:fillRect/>
+          </a:stretch>
+        </p:blipFill>
+        <p:spPr>
+          <a:xfrm>
+            <a:off x="8918575" y="751534"/>
+            <a:ext cx="1905000" cy="1905000"/>
+          </a:xfrm>
+          <a:prstGeom prst="ellipse">
+            <a:avLst/>
+          </a:prstGeom>
+          <a:ln>
+            <a:noFill/>
+          </a:ln>
+          <a:effectLst>
+            <a:softEdge rad="112500"/>
+          </a:effectLst>
+        </p:spPr>
+      </p:pic>
+      <p:pic>
+        <p:nvPicPr>
+          <p:cNvPr id="21" name="Billede 20" descr="Et billede, der indeholder cirkel, symbol, Grafik, logo&#10;&#10;AI-genereret indhold kan være ukorrekt.">
+            <a:extLst>
+              <a:ext uri="{FF2B5EF4-FFF2-40B4-BE49-F238E27FC236}">
+                <a16:creationId xmlns:a16="http://schemas.microsoft.com/office/drawing/2014/main" id="{C0FF4909-7394-2814-431B-6DFA30B2471B}"/>
+              </a:ext>
+            </a:extLst>
+          </p:cNvPr>
+          <p:cNvPicPr>
+            <a:picLocks noChangeAspect="1"/>
+          </p:cNvPicPr>
+          <p:nvPr/>
+        </p:nvPicPr>
+        <p:blipFill>
+          <a:blip r:embed="rId4"/>
+          <a:stretch>
+            <a:fillRect/>
+          </a:stretch>
+        </p:blipFill>
+        <p:spPr>
+          <a:xfrm>
+            <a:off x="8703724" y="3372211"/>
+            <a:ext cx="3428571" cy="3288889"/>
+          </a:xfrm>
+          <a:prstGeom prst="rect">
+            <a:avLst/>
+          </a:prstGeom>
+        </p:spPr>
+      </p:pic>
     </p:spTree>
     <p:extLst>
       <p:ext uri="{BB962C8B-B14F-4D97-AF65-F5344CB8AC3E}">
@@ -16721,54 +16428,9 @@
           </a:bodyPr>
           <a:lstStyle/>
           <a:p>
-            <a:pPr rtl="0">
-              <a:spcAft>
-                <a:spcPts val="600"/>
-              </a:spcAft>
-            </a:pPr>
-            <a:r>
-              <a:rPr lang="da-DK" noProof="0"/>
-              <a:t>Tirsdag d. 2. februar 20XX</a:t>
-            </a:r>
-          </a:p>
-        </p:txBody>
-      </p:sp>
-      <p:sp>
-        <p:nvSpPr>
-          <p:cNvPr id="4" name="Pladsholder til sidefod 3">
-            <a:extLst>
-              <a:ext uri="{FF2B5EF4-FFF2-40B4-BE49-F238E27FC236}">
-                <a16:creationId xmlns:a16="http://schemas.microsoft.com/office/drawing/2014/main" id="{DF16B1D4-21E6-7F0C-3452-16F0B42B94CA}"/>
-              </a:ext>
-            </a:extLst>
-          </p:cNvPr>
-          <p:cNvSpPr>
-            <a:spLocks noGrp="1"/>
-          </p:cNvSpPr>
-          <p:nvPr>
-            <p:ph type="ftr" sz="quarter" idx="11"/>
-          </p:nvPr>
-        </p:nvSpPr>
-        <p:spPr>
-          <a:xfrm>
-            <a:off x="3359150" y="6507212"/>
-            <a:ext cx="6379210" cy="153888"/>
-          </a:xfrm>
-        </p:spPr>
-        <p:txBody>
-          <a:bodyPr wrap="square" anchor="ctr">
-            <a:normAutofit/>
-          </a:bodyPr>
-          <a:lstStyle/>
-          <a:p>
-            <a:pPr rtl="0">
-              <a:spcAft>
-                <a:spcPts val="600"/>
-              </a:spcAft>
-            </a:pPr>
-            <a:r>
-              <a:rPr lang="da-DK" noProof="0"/>
-              <a:t>Eksempel på fodnotetekst</a:t>
+            <a:r>
+              <a:rPr lang="da-DK" dirty="0"/>
+              <a:t>Tirsdag d. 7. oktober 2025</a:t>
             </a:r>
           </a:p>
         </p:txBody>
@@ -17032,44 +16694,9 @@
           <a:bodyPr rtlCol="0"/>
           <a:lstStyle/>
           <a:p>
-            <a:pPr rtl="0"/>
             <a:r>
               <a:rPr lang="da-DK" dirty="0"/>
-              <a:t>Tirsdag d. 2. februar 20XX</a:t>
-            </a:r>
-          </a:p>
-        </p:txBody>
-      </p:sp>
-      <p:sp>
-        <p:nvSpPr>
-          <p:cNvPr id="5" name="Pladsholder til sidefod 4">
-            <a:extLst>
-              <a:ext uri="{FF2B5EF4-FFF2-40B4-BE49-F238E27FC236}">
-                <a16:creationId xmlns:a16="http://schemas.microsoft.com/office/drawing/2014/main" id="{AFD183D7-B16E-4A9D-BC4B-D1EC347BF97E}"/>
-              </a:ext>
-            </a:extLst>
-          </p:cNvPr>
-          <p:cNvSpPr>
-            <a:spLocks noGrp="1"/>
-          </p:cNvSpPr>
-          <p:nvPr>
-            <p:ph type="ftr" sz="quarter" idx="11"/>
-          </p:nvPr>
-        </p:nvSpPr>
-        <p:spPr>
-          <a:xfrm>
-            <a:off x="3359150" y="6507212"/>
-            <a:ext cx="6379210" cy="153888"/>
-          </a:xfrm>
-        </p:spPr>
-        <p:txBody>
-          <a:bodyPr rtlCol="0"/>
-          <a:lstStyle/>
-          <a:p>
-            <a:pPr rtl="0"/>
-            <a:r>
-              <a:rPr lang="da-DK" dirty="0"/>
-              <a:t>Eksempel på fodnotetekst</a:t>
+              <a:t>Tirsdag d. 7. oktober 2025</a:t>
             </a:r>
           </a:p>
         </p:txBody>
@@ -17230,44 +16857,9 @@
           <a:bodyPr rtlCol="0"/>
           <a:lstStyle/>
           <a:p>
-            <a:pPr rtl="0"/>
-            <a:r>
-              <a:rPr lang="da-DK"/>
-              <a:t>Tirsdag d. 2. februar 20XX</a:t>
-            </a:r>
-          </a:p>
-        </p:txBody>
-      </p:sp>
-      <p:sp>
-        <p:nvSpPr>
-          <p:cNvPr id="15" name="Pladsholder til sidefod 14">
-            <a:extLst>
-              <a:ext uri="{FF2B5EF4-FFF2-40B4-BE49-F238E27FC236}">
-                <a16:creationId xmlns:a16="http://schemas.microsoft.com/office/drawing/2014/main" id="{CD05A243-8080-4F6D-8538-65CDDF891BA6}"/>
-              </a:ext>
-            </a:extLst>
-          </p:cNvPr>
-          <p:cNvSpPr>
-            <a:spLocks noGrp="1"/>
-          </p:cNvSpPr>
-          <p:nvPr>
-            <p:ph type="ftr" sz="quarter" idx="11"/>
-          </p:nvPr>
-        </p:nvSpPr>
-        <p:spPr>
-          <a:xfrm>
-            <a:off x="3359150" y="6507212"/>
-            <a:ext cx="6379210" cy="153888"/>
-          </a:xfrm>
-        </p:spPr>
-        <p:txBody>
-          <a:bodyPr rtlCol="0"/>
-          <a:lstStyle/>
-          <a:p>
-            <a:pPr rtl="0"/>
-            <a:r>
-              <a:rPr lang="da-DK"/>
-              <a:t>Eksempel på fodnotetekst</a:t>
+            <a:r>
+              <a:rPr lang="da-DK" dirty="0"/>
+              <a:t>Tirsdag d. 7. oktober 2025</a:t>
             </a:r>
           </a:p>
         </p:txBody>
@@ -17330,7 +16922,7 @@
         </p:blipFill>
         <p:spPr>
           <a:xfrm>
-            <a:off x="337279" y="1425697"/>
+            <a:off x="289810" y="2426919"/>
             <a:ext cx="11759784" cy="549068"/>
           </a:xfrm>
           <a:prstGeom prst="rect">
@@ -17360,7 +16952,7 @@
         </p:blipFill>
         <p:spPr>
           <a:xfrm>
-            <a:off x="289810" y="2126536"/>
+            <a:off x="289810" y="3628764"/>
             <a:ext cx="11854721" cy="724651"/>
           </a:xfrm>
           <a:prstGeom prst="rect">
@@ -17449,37 +17041,8 @@
           <a:p>
             <a:pPr rtl="0"/>
             <a:r>
-              <a:rPr lang="da-DK" noProof="0"/>
-              <a:t>Tirsdag d. 2. februar 20XX</a:t>
-            </a:r>
-          </a:p>
-        </p:txBody>
-      </p:sp>
-      <p:sp>
-        <p:nvSpPr>
-          <p:cNvPr id="5" name="Pladsholder til sidefod 4">
-            <a:extLst>
-              <a:ext uri="{FF2B5EF4-FFF2-40B4-BE49-F238E27FC236}">
-                <a16:creationId xmlns:a16="http://schemas.microsoft.com/office/drawing/2014/main" id="{8860956B-77D8-79E7-9C53-F20CAEC9B7E0}"/>
-              </a:ext>
-            </a:extLst>
-          </p:cNvPr>
-          <p:cNvSpPr>
-            <a:spLocks noGrp="1"/>
-          </p:cNvSpPr>
-          <p:nvPr>
-            <p:ph type="ftr" sz="quarter" idx="11"/>
-          </p:nvPr>
-        </p:nvSpPr>
-        <p:spPr/>
-        <p:txBody>
-          <a:bodyPr/>
-          <a:lstStyle/>
-          <a:p>
-            <a:pPr rtl="0"/>
-            <a:r>
-              <a:rPr lang="da-DK" noProof="0"/>
-              <a:t>Eksempel på fodnotetekst</a:t>
+              <a:rPr lang="da-DK" noProof="0" dirty="0"/>
+              <a:t>Tirsdag d. 7. oktober 2025</a:t>
             </a:r>
           </a:p>
         </p:txBody>

</xml_diff>